<commit_message>
chap 1 script video perf
</commit_message>
<xml_diff>
--- a/scripts/Chapter1.pptx
+++ b/scripts/Chapter1.pptx
@@ -31,16 +31,17 @@
     <p:sldId id="279" r:id="rId25"/>
     <p:sldId id="286" r:id="rId26"/>
     <p:sldId id="287" r:id="rId27"/>
-    <p:sldId id="289" r:id="rId28"/>
-    <p:sldId id="290" r:id="rId29"/>
-    <p:sldId id="274" r:id="rId30"/>
-    <p:sldId id="272" r:id="rId31"/>
-    <p:sldId id="292" r:id="rId32"/>
-    <p:sldId id="293" r:id="rId33"/>
-    <p:sldId id="291" r:id="rId34"/>
-    <p:sldId id="288" r:id="rId35"/>
-    <p:sldId id="294" r:id="rId36"/>
-    <p:sldId id="295" r:id="rId37"/>
+    <p:sldId id="297" r:id="rId28"/>
+    <p:sldId id="289" r:id="rId29"/>
+    <p:sldId id="290" r:id="rId30"/>
+    <p:sldId id="274" r:id="rId31"/>
+    <p:sldId id="272" r:id="rId32"/>
+    <p:sldId id="292" r:id="rId33"/>
+    <p:sldId id="293" r:id="rId34"/>
+    <p:sldId id="291" r:id="rId35"/>
+    <p:sldId id="288" r:id="rId36"/>
+    <p:sldId id="294" r:id="rId37"/>
+    <p:sldId id="295" r:id="rId38"/>
   </p:sldIdLst>
   <p:sldSz cx="9144000" cy="6858000" type="screen4x3"/>
   <p:notesSz cx="6858000" cy="9144000"/>
@@ -323,7 +324,7 @@
           <a:p>
             <a:fld id="{F199DA73-FF55-4AFB-8A45-BCAA78D6E465}" type="datetimeFigureOut">
               <a:rPr lang="nl-BE" smtClean="0"/>
-              <a:t>27/04/2016</a:t>
+              <a:t>29/04/2016</a:t>
             </a:fld>
             <a:endParaRPr lang="nl-BE"/>
           </a:p>
@@ -493,7 +494,7 @@
           <a:p>
             <a:fld id="{F199DA73-FF55-4AFB-8A45-BCAA78D6E465}" type="datetimeFigureOut">
               <a:rPr lang="nl-BE" smtClean="0"/>
-              <a:t>27/04/2016</a:t>
+              <a:t>29/04/2016</a:t>
             </a:fld>
             <a:endParaRPr lang="nl-BE"/>
           </a:p>
@@ -673,7 +674,7 @@
           <a:p>
             <a:fld id="{F199DA73-FF55-4AFB-8A45-BCAA78D6E465}" type="datetimeFigureOut">
               <a:rPr lang="nl-BE" smtClean="0"/>
-              <a:t>27/04/2016</a:t>
+              <a:t>29/04/2016</a:t>
             </a:fld>
             <a:endParaRPr lang="nl-BE"/>
           </a:p>
@@ -843,7 +844,7 @@
           <a:p>
             <a:fld id="{F199DA73-FF55-4AFB-8A45-BCAA78D6E465}" type="datetimeFigureOut">
               <a:rPr lang="nl-BE" smtClean="0"/>
-              <a:t>27/04/2016</a:t>
+              <a:t>29/04/2016</a:t>
             </a:fld>
             <a:endParaRPr lang="nl-BE"/>
           </a:p>
@@ -1089,7 +1090,7 @@
           <a:p>
             <a:fld id="{F199DA73-FF55-4AFB-8A45-BCAA78D6E465}" type="datetimeFigureOut">
               <a:rPr lang="nl-BE" smtClean="0"/>
-              <a:t>27/04/2016</a:t>
+              <a:t>29/04/2016</a:t>
             </a:fld>
             <a:endParaRPr lang="nl-BE"/>
           </a:p>
@@ -1377,7 +1378,7 @@
           <a:p>
             <a:fld id="{F199DA73-FF55-4AFB-8A45-BCAA78D6E465}" type="datetimeFigureOut">
               <a:rPr lang="nl-BE" smtClean="0"/>
-              <a:t>27/04/2016</a:t>
+              <a:t>29/04/2016</a:t>
             </a:fld>
             <a:endParaRPr lang="nl-BE"/>
           </a:p>
@@ -1799,7 +1800,7 @@
           <a:p>
             <a:fld id="{F199DA73-FF55-4AFB-8A45-BCAA78D6E465}" type="datetimeFigureOut">
               <a:rPr lang="nl-BE" smtClean="0"/>
-              <a:t>27/04/2016</a:t>
+              <a:t>29/04/2016</a:t>
             </a:fld>
             <a:endParaRPr lang="nl-BE"/>
           </a:p>
@@ -1917,7 +1918,7 @@
           <a:p>
             <a:fld id="{F199DA73-FF55-4AFB-8A45-BCAA78D6E465}" type="datetimeFigureOut">
               <a:rPr lang="nl-BE" smtClean="0"/>
-              <a:t>27/04/2016</a:t>
+              <a:t>29/04/2016</a:t>
             </a:fld>
             <a:endParaRPr lang="nl-BE"/>
           </a:p>
@@ -2012,7 +2013,7 @@
           <a:p>
             <a:fld id="{F199DA73-FF55-4AFB-8A45-BCAA78D6E465}" type="datetimeFigureOut">
               <a:rPr lang="nl-BE" smtClean="0"/>
-              <a:t>27/04/2016</a:t>
+              <a:t>29/04/2016</a:t>
             </a:fld>
             <a:endParaRPr lang="nl-BE"/>
           </a:p>
@@ -2289,7 +2290,7 @@
           <a:p>
             <a:fld id="{F199DA73-FF55-4AFB-8A45-BCAA78D6E465}" type="datetimeFigureOut">
               <a:rPr lang="nl-BE" smtClean="0"/>
-              <a:t>27/04/2016</a:t>
+              <a:t>29/04/2016</a:t>
             </a:fld>
             <a:endParaRPr lang="nl-BE"/>
           </a:p>
@@ -2542,7 +2543,7 @@
           <a:p>
             <a:fld id="{F199DA73-FF55-4AFB-8A45-BCAA78D6E465}" type="datetimeFigureOut">
               <a:rPr lang="nl-BE" smtClean="0"/>
-              <a:t>27/04/2016</a:t>
+              <a:t>29/04/2016</a:t>
             </a:fld>
             <a:endParaRPr lang="nl-BE"/>
           </a:p>
@@ -2755,7 +2756,7 @@
           <a:p>
             <a:fld id="{F199DA73-FF55-4AFB-8A45-BCAA78D6E465}" type="datetimeFigureOut">
               <a:rPr lang="nl-BE" smtClean="0"/>
-              <a:t>27/04/2016</a:t>
+              <a:t>29/04/2016</a:t>
             </a:fld>
             <a:endParaRPr lang="nl-BE"/>
           </a:p>
@@ -5328,7 +5329,7 @@
         <p:spPr/>
         <p:txBody>
           <a:bodyPr>
-            <a:normAutofit fontScale="90000"/>
+            <a:normAutofit/>
           </a:bodyPr>
           <a:lstStyle/>
           <a:p>
@@ -5342,7 +5343,7 @@
             </a:r>
             <a:r>
               <a:rPr lang="en-US" dirty="0"/>
-              <a:t>One-period portfolio returns are the weighted average of the individual returns</a:t>
+              <a:t>The return of a portfolio is the weighted average return</a:t>
             </a:r>
             <a:endParaRPr lang="nl-BE" dirty="0"/>
           </a:p>
@@ -9149,7 +9150,7 @@
         <p:spPr/>
         <p:txBody>
           <a:bodyPr>
-            <a:normAutofit fontScale="90000"/>
+            <a:normAutofit/>
           </a:bodyPr>
           <a:lstStyle/>
           <a:p>
@@ -9159,23 +9160,19 @@
             </a:r>
             <a:r>
               <a:rPr lang="en-US" dirty="0" smtClean="0"/>
-              <a:t>4: The </a:t>
-            </a:r>
-            <a:r>
-              <a:rPr lang="en-US" dirty="0" err="1" smtClean="0"/>
-              <a:t>PerformanceAnalytics</a:t>
+              <a:t>4: </a:t>
+            </a:r>
+            <a:r>
+              <a:rPr lang="en-US" dirty="0"/>
+              <a:t>To rebalance </a:t>
             </a:r>
             <a:r>
               <a:rPr lang="en-US" dirty="0" smtClean="0"/>
-              <a:t> package and </a:t>
-            </a:r>
-            <a:r>
-              <a:rPr lang="en-US" dirty="0" err="1" smtClean="0"/>
-              <a:t>multiperiod</a:t>
-            </a:r>
-            <a:r>
-              <a:rPr lang="en-US" dirty="0" smtClean="0"/>
-              <a:t> returns</a:t>
+              <a:t>or not </a:t>
+            </a:r>
+            <a:r>
+              <a:rPr lang="en-US" dirty="0"/>
+              <a:t>to rebalance</a:t>
             </a:r>
             <a:endParaRPr lang="nl-BE" dirty="0"/>
           </a:p>
@@ -9261,59 +9258,17 @@
         </p:nvSpPr>
         <p:spPr/>
         <p:txBody>
-          <a:bodyPr>
-            <a:normAutofit lnSpcReduction="10000"/>
-          </a:bodyPr>
-          <a:lstStyle/>
-          <a:p>
-            <a:r>
-              <a:rPr lang="nl-BE" dirty="0" smtClean="0"/>
-              <a:t>We have seen single period returns of a portfolio with only a few investments </a:t>
-            </a:r>
-          </a:p>
-          <a:p>
-            <a:r>
-              <a:rPr lang="nl-BE" dirty="0" smtClean="0"/>
-              <a:t>In practice:</a:t>
-            </a:r>
-          </a:p>
-          <a:p>
-            <a:pPr lvl="1"/>
-            <a:r>
-              <a:rPr lang="nl-BE" dirty="0" smtClean="0"/>
-              <a:t>Multi-period investments</a:t>
-            </a:r>
-          </a:p>
-          <a:p>
-            <a:pPr lvl="1"/>
-            <a:r>
-              <a:rPr lang="nl-BE" dirty="0" smtClean="0"/>
-              <a:t>Larger portfolios</a:t>
-            </a:r>
-          </a:p>
-          <a:p>
-            <a:r>
-              <a:rPr lang="nl-BE" dirty="0" smtClean="0"/>
-              <a:t>Scalability is possible using the functionality of the R package PerformanceAnalytics </a:t>
-            </a:r>
-          </a:p>
-          <a:p>
-            <a:r>
-              <a:rPr lang="nl-BE" dirty="0" smtClean="0"/>
-              <a:t>Illustration for the </a:t>
-            </a:r>
-            <a:r>
-              <a:rPr lang="en-US" dirty="0" smtClean="0"/>
-              <a:t>30 DJIA stocks over 25 years with monthly rebalancing</a:t>
-            </a:r>
-            <a:endParaRPr lang="nl-BE" dirty="0"/>
+          <a:bodyPr/>
+          <a:lstStyle/>
+          <a:p>
+            <a:endParaRPr lang="nl-BE"/>
           </a:p>
         </p:txBody>
       </p:sp>
     </p:spTree>
     <p:extLst>
       <p:ext uri="{BB962C8B-B14F-4D97-AF65-F5344CB8AC3E}">
-        <p14:creationId xmlns:p14="http://schemas.microsoft.com/office/powerpoint/2010/main" val="135852190"/>
+        <p14:creationId xmlns:p14="http://schemas.microsoft.com/office/powerpoint/2010/main" val="1101171704"/>
       </p:ext>
     </p:extLst>
   </p:cSld>
@@ -9371,6 +9326,116 @@
         </p:nvSpPr>
         <p:spPr/>
         <p:txBody>
+          <a:bodyPr>
+            <a:normAutofit lnSpcReduction="10000"/>
+          </a:bodyPr>
+          <a:lstStyle/>
+          <a:p>
+            <a:r>
+              <a:rPr lang="nl-BE" dirty="0" smtClean="0"/>
+              <a:t>We have seen single period returns of a portfolio with only a few investments </a:t>
+            </a:r>
+          </a:p>
+          <a:p>
+            <a:r>
+              <a:rPr lang="nl-BE" dirty="0" smtClean="0"/>
+              <a:t>In practice:</a:t>
+            </a:r>
+          </a:p>
+          <a:p>
+            <a:pPr lvl="1"/>
+            <a:r>
+              <a:rPr lang="nl-BE" dirty="0" smtClean="0"/>
+              <a:t>Multi-period investments</a:t>
+            </a:r>
+          </a:p>
+          <a:p>
+            <a:pPr lvl="1"/>
+            <a:r>
+              <a:rPr lang="nl-BE" dirty="0" smtClean="0"/>
+              <a:t>Larger portfolios</a:t>
+            </a:r>
+          </a:p>
+          <a:p>
+            <a:r>
+              <a:rPr lang="nl-BE" dirty="0" smtClean="0"/>
+              <a:t>Scalability is possible using the functionality of the R package PerformanceAnalytics </a:t>
+            </a:r>
+          </a:p>
+          <a:p>
+            <a:r>
+              <a:rPr lang="nl-BE" dirty="0" smtClean="0"/>
+              <a:t>Illustration for the </a:t>
+            </a:r>
+            <a:r>
+              <a:rPr lang="en-US" dirty="0" smtClean="0"/>
+              <a:t>30 DJIA stocks over 25 years with monthly rebalancing</a:t>
+            </a:r>
+            <a:endParaRPr lang="nl-BE" dirty="0"/>
+          </a:p>
+        </p:txBody>
+      </p:sp>
+    </p:spTree>
+    <p:extLst>
+      <p:ext uri="{BB962C8B-B14F-4D97-AF65-F5344CB8AC3E}">
+        <p14:creationId xmlns:p14="http://schemas.microsoft.com/office/powerpoint/2010/main" val="135852190"/>
+      </p:ext>
+    </p:extLst>
+  </p:cSld>
+  <p:clrMapOvr>
+    <a:masterClrMapping/>
+  </p:clrMapOvr>
+</p:sld>
+</file>
+
+<file path=ppt/slides/slide29.xml><?xml version="1.0" encoding="utf-8"?>
+<p:sld xmlns:a="http://schemas.openxmlformats.org/drawingml/2006/main" xmlns:r="http://schemas.openxmlformats.org/officeDocument/2006/relationships" xmlns:p="http://schemas.openxmlformats.org/presentationml/2006/main">
+  <p:cSld>
+    <p:spTree>
+      <p:nvGrpSpPr>
+        <p:cNvPr id="1" name=""/>
+        <p:cNvGrpSpPr/>
+        <p:nvPr/>
+      </p:nvGrpSpPr>
+      <p:grpSpPr>
+        <a:xfrm>
+          <a:off x="0" y="0"/>
+          <a:ext cx="0" cy="0"/>
+          <a:chOff x="0" y="0"/>
+          <a:chExt cx="0" cy="0"/>
+        </a:xfrm>
+      </p:grpSpPr>
+      <p:sp>
+        <p:nvSpPr>
+          <p:cNvPr id="2" name="Title 1"/>
+          <p:cNvSpPr>
+            <a:spLocks noGrp="1"/>
+          </p:cNvSpPr>
+          <p:nvPr>
+            <p:ph type="title"/>
+          </p:nvPr>
+        </p:nvSpPr>
+        <p:spPr/>
+        <p:txBody>
+          <a:bodyPr/>
+          <a:lstStyle/>
+          <a:p>
+            <a:endParaRPr lang="nl-BE"/>
+          </a:p>
+        </p:txBody>
+      </p:sp>
+      <p:sp>
+        <p:nvSpPr>
+          <p:cNvPr id="3" name="Content Placeholder 2"/>
+          <p:cNvSpPr>
+            <a:spLocks noGrp="1"/>
+          </p:cNvSpPr>
+          <p:nvPr>
+            <p:ph idx="1"/>
+          </p:nvPr>
+        </p:nvSpPr>
+        <p:spPr/>
+        <p:txBody>
           <a:bodyPr/>
           <a:lstStyle/>
           <a:p>
@@ -9395,7 +9460,109 @@
 </p:sld>
 </file>
 
-<file path=ppt/slides/slide29.xml><?xml version="1.0" encoding="utf-8"?>
+<file path=ppt/slides/slide3.xml><?xml version="1.0" encoding="utf-8"?>
+<p:sld xmlns:a="http://schemas.openxmlformats.org/drawingml/2006/main" xmlns:r="http://schemas.openxmlformats.org/officeDocument/2006/relationships" xmlns:p="http://schemas.openxmlformats.org/presentationml/2006/main">
+  <p:cSld>
+    <p:spTree>
+      <p:nvGrpSpPr>
+        <p:cNvPr id="1" name=""/>
+        <p:cNvGrpSpPr/>
+        <p:nvPr/>
+      </p:nvGrpSpPr>
+      <p:grpSpPr>
+        <a:xfrm>
+          <a:off x="0" y="0"/>
+          <a:ext cx="0" cy="0"/>
+          <a:chOff x="0" y="0"/>
+          <a:chExt cx="0" cy="0"/>
+        </a:xfrm>
+      </p:grpSpPr>
+      <p:sp>
+        <p:nvSpPr>
+          <p:cNvPr id="2" name="Title 1"/>
+          <p:cNvSpPr>
+            <a:spLocks noGrp="1"/>
+          </p:cNvSpPr>
+          <p:nvPr>
+            <p:ph type="title"/>
+          </p:nvPr>
+        </p:nvSpPr>
+        <p:spPr/>
+        <p:txBody>
+          <a:bodyPr/>
+          <a:lstStyle/>
+          <a:p>
+            <a:r>
+              <a:rPr lang="nl-BE" dirty="0" smtClean="0"/>
+              <a:t>About myself</a:t>
+            </a:r>
+            <a:endParaRPr lang="nl-BE" dirty="0"/>
+          </a:p>
+        </p:txBody>
+      </p:sp>
+      <p:sp>
+        <p:nvSpPr>
+          <p:cNvPr id="3" name="Content Placeholder 2"/>
+          <p:cNvSpPr>
+            <a:spLocks noGrp="1"/>
+          </p:cNvSpPr>
+          <p:nvPr>
+            <p:ph idx="1"/>
+          </p:nvPr>
+        </p:nvSpPr>
+        <p:spPr/>
+        <p:txBody>
+          <a:bodyPr>
+            <a:normAutofit fontScale="92500" lnSpcReduction="20000"/>
+          </a:bodyPr>
+          <a:lstStyle/>
+          <a:p>
+            <a:r>
+              <a:rPr lang="nl-BE" dirty="0" smtClean="0"/>
+              <a:t>Professor of finance, Vrije Universiteit Brussel and Amsterdam;</a:t>
+            </a:r>
+          </a:p>
+          <a:p>
+            <a:r>
+              <a:rPr lang="nl-BE" dirty="0" smtClean="0"/>
+              <a:t>Inventor of statistical methodology for reliable financial decision</a:t>
+            </a:r>
+          </a:p>
+          <a:p>
+            <a:r>
+              <a:rPr lang="nl-BE" dirty="0" smtClean="0"/>
+              <a:t>Publications in the Journal of Portfolio Management and Review of Finance, among others.</a:t>
+            </a:r>
+          </a:p>
+          <a:p>
+            <a:r>
+              <a:rPr lang="nl-BE" dirty="0" smtClean="0"/>
+              <a:t>Contributor to the R packages PerformanceAnalytics, PortfolioAnalytics and highfrequency, among others.</a:t>
+            </a:r>
+          </a:p>
+          <a:p>
+            <a:r>
+              <a:rPr lang="nl-BE" dirty="0" smtClean="0"/>
+              <a:t>Consultancy to investment firms. </a:t>
+            </a:r>
+            <a:endParaRPr lang="nl-BE" dirty="0"/>
+          </a:p>
+        </p:txBody>
+      </p:sp>
+    </p:spTree>
+    <p:extLst>
+      <p:ext uri="{BB962C8B-B14F-4D97-AF65-F5344CB8AC3E}">
+        <p14:creationId xmlns:p14="http://schemas.microsoft.com/office/powerpoint/2010/main" val="561958690"/>
+      </p:ext>
+    </p:extLst>
+  </p:cSld>
+  <p:clrMapOvr>
+    <a:masterClrMapping/>
+  </p:clrMapOvr>
+</p:sld>
+</file>
+
+<file path=ppt/slides/slide30.xml><?xml version="1.0" encoding="utf-8"?>
 <p:sld xmlns:a="http://schemas.openxmlformats.org/drawingml/2006/main" xmlns:r="http://schemas.openxmlformats.org/officeDocument/2006/relationships" xmlns:p="http://schemas.openxmlformats.org/presentationml/2006/main">
   <p:cSld>
     <p:spTree>
@@ -9912,109 +10079,7 @@
 </p:sld>
 </file>
 
-<file path=ppt/slides/slide3.xml><?xml version="1.0" encoding="utf-8"?>
-<p:sld xmlns:a="http://schemas.openxmlformats.org/drawingml/2006/main" xmlns:r="http://schemas.openxmlformats.org/officeDocument/2006/relationships" xmlns:p="http://schemas.openxmlformats.org/presentationml/2006/main">
-  <p:cSld>
-    <p:spTree>
-      <p:nvGrpSpPr>
-        <p:cNvPr id="1" name=""/>
-        <p:cNvGrpSpPr/>
-        <p:nvPr/>
-      </p:nvGrpSpPr>
-      <p:grpSpPr>
-        <a:xfrm>
-          <a:off x="0" y="0"/>
-          <a:ext cx="0" cy="0"/>
-          <a:chOff x="0" y="0"/>
-          <a:chExt cx="0" cy="0"/>
-        </a:xfrm>
-      </p:grpSpPr>
-      <p:sp>
-        <p:nvSpPr>
-          <p:cNvPr id="2" name="Title 1"/>
-          <p:cNvSpPr>
-            <a:spLocks noGrp="1"/>
-          </p:cNvSpPr>
-          <p:nvPr>
-            <p:ph type="title"/>
-          </p:nvPr>
-        </p:nvSpPr>
-        <p:spPr/>
-        <p:txBody>
-          <a:bodyPr/>
-          <a:lstStyle/>
-          <a:p>
-            <a:r>
-              <a:rPr lang="nl-BE" dirty="0" smtClean="0"/>
-              <a:t>About myself</a:t>
-            </a:r>
-            <a:endParaRPr lang="nl-BE" dirty="0"/>
-          </a:p>
-        </p:txBody>
-      </p:sp>
-      <p:sp>
-        <p:nvSpPr>
-          <p:cNvPr id="3" name="Content Placeholder 2"/>
-          <p:cNvSpPr>
-            <a:spLocks noGrp="1"/>
-          </p:cNvSpPr>
-          <p:nvPr>
-            <p:ph idx="1"/>
-          </p:nvPr>
-        </p:nvSpPr>
-        <p:spPr/>
-        <p:txBody>
-          <a:bodyPr>
-            <a:normAutofit fontScale="92500" lnSpcReduction="20000"/>
-          </a:bodyPr>
-          <a:lstStyle/>
-          <a:p>
-            <a:r>
-              <a:rPr lang="nl-BE" dirty="0" smtClean="0"/>
-              <a:t>Professor of finance, Vrije Universiteit Brussel and Amsterdam;</a:t>
-            </a:r>
-          </a:p>
-          <a:p>
-            <a:r>
-              <a:rPr lang="nl-BE" dirty="0" smtClean="0"/>
-              <a:t>Inventor of statistical methodology for reliable financial decision</a:t>
-            </a:r>
-          </a:p>
-          <a:p>
-            <a:r>
-              <a:rPr lang="nl-BE" dirty="0" smtClean="0"/>
-              <a:t>Publications in the Journal of Portfolio Management and Review of Finance, among others.</a:t>
-            </a:r>
-          </a:p>
-          <a:p>
-            <a:r>
-              <a:rPr lang="nl-BE" dirty="0" smtClean="0"/>
-              <a:t>Contributor to the R packages PerformanceAnalytics, PortfolioAnalytics and highfrequency, among others.</a:t>
-            </a:r>
-          </a:p>
-          <a:p>
-            <a:r>
-              <a:rPr lang="nl-BE" dirty="0" smtClean="0"/>
-              <a:t>Consultancy to investment firms. </a:t>
-            </a:r>
-            <a:endParaRPr lang="nl-BE" dirty="0"/>
-          </a:p>
-        </p:txBody>
-      </p:sp>
-    </p:spTree>
-    <p:extLst>
-      <p:ext uri="{BB962C8B-B14F-4D97-AF65-F5344CB8AC3E}">
-        <p14:creationId xmlns:p14="http://schemas.microsoft.com/office/powerpoint/2010/main" val="561958690"/>
-      </p:ext>
-    </p:extLst>
-  </p:cSld>
-  <p:clrMapOvr>
-    <a:masterClrMapping/>
-  </p:clrMapOvr>
-</p:sld>
-</file>
-
-<file path=ppt/slides/slide30.xml><?xml version="1.0" encoding="utf-8"?>
+<file path=ppt/slides/slide31.xml><?xml version="1.0" encoding="utf-8"?>
 <p:sld xmlns:a="http://schemas.openxmlformats.org/drawingml/2006/main" xmlns:r="http://schemas.openxmlformats.org/officeDocument/2006/relationships" xmlns:p="http://schemas.openxmlformats.org/presentationml/2006/main">
   <p:cSld>
     <p:spTree>
@@ -10652,7 +10717,7 @@
 </p:sld>
 </file>
 
-<file path=ppt/slides/slide31.xml><?xml version="1.0" encoding="utf-8"?>
+<file path=ppt/slides/slide32.xml><?xml version="1.0" encoding="utf-8"?>
 <p:sld xmlns:a="http://schemas.openxmlformats.org/drawingml/2006/main" xmlns:r="http://schemas.openxmlformats.org/officeDocument/2006/relationships" xmlns:p="http://schemas.openxmlformats.org/presentationml/2006/main">
   <p:cSld>
     <p:spTree>
@@ -10988,14 +11053,7 @@
                         <m:nor/>
                       </m:rPr>
                       <a:rPr lang="nl-BE" dirty="0" smtClean="0"/>
-                      <m:t>) </m:t>
-                    </m:r>
-                    <m:r>
-                      <m:rPr>
-                        <m:nor/>
-                      </m:rPr>
-                      <a:rPr lang="nl-BE" b="0" i="0" dirty="0" smtClean="0"/>
-                      <m:t>−1</m:t>
+                      <m:t>) −1</m:t>
                     </m:r>
                   </m:oMath>
                 </a14:m>
@@ -11051,138 +11109,6 @@
 </p:sld>
 </file>
 
-<file path=ppt/slides/slide32.xml><?xml version="1.0" encoding="utf-8"?>
-<p:sld xmlns:a="http://schemas.openxmlformats.org/drawingml/2006/main" xmlns:r="http://schemas.openxmlformats.org/officeDocument/2006/relationships" xmlns:p="http://schemas.openxmlformats.org/presentationml/2006/main">
-  <p:cSld>
-    <p:spTree>
-      <p:nvGrpSpPr>
-        <p:cNvPr id="1" name=""/>
-        <p:cNvGrpSpPr/>
-        <p:nvPr/>
-      </p:nvGrpSpPr>
-      <p:grpSpPr>
-        <a:xfrm>
-          <a:off x="0" y="0"/>
-          <a:ext cx="0" cy="0"/>
-          <a:chOff x="0" y="0"/>
-          <a:chExt cx="0" cy="0"/>
-        </a:xfrm>
-      </p:grpSpPr>
-      <p:sp>
-        <p:nvSpPr>
-          <p:cNvPr id="2" name="Title 1"/>
-          <p:cNvSpPr>
-            <a:spLocks noGrp="1"/>
-          </p:cNvSpPr>
-          <p:nvPr>
-            <p:ph type="title"/>
-          </p:nvPr>
-        </p:nvSpPr>
-        <p:spPr/>
-        <p:txBody>
-          <a:bodyPr/>
-          <a:lstStyle/>
-          <a:p>
-            <a:endParaRPr lang="nl-BE"/>
-          </a:p>
-        </p:txBody>
-      </p:sp>
-      <p:sp>
-        <p:nvSpPr>
-          <p:cNvPr id="3" name="Content Placeholder 2"/>
-          <p:cNvSpPr>
-            <a:spLocks noGrp="1"/>
-          </p:cNvSpPr>
-          <p:nvPr>
-            <p:ph idx="1"/>
-          </p:nvPr>
-        </p:nvSpPr>
-        <p:spPr/>
-        <p:txBody>
-          <a:bodyPr/>
-          <a:lstStyle/>
-          <a:p>
-            <a:pPr marL="0" indent="0">
-              <a:buNone/>
-            </a:pPr>
-            <a:r>
-              <a:rPr lang="en-US" dirty="0" smtClean="0"/>
-              <a:t>returns &lt;- </a:t>
-            </a:r>
-            <a:r>
-              <a:rPr lang="en-US" dirty="0"/>
-              <a:t>c( 0.05 , -0.01 , 0.03 , 0.02 , 0.01 ) </a:t>
-            </a:r>
-            <a:r>
-              <a:rPr lang="en-US" dirty="0" err="1" smtClean="0"/>
-              <a:t>cumprod</a:t>
-            </a:r>
-            <a:r>
-              <a:rPr lang="en-US" dirty="0" smtClean="0"/>
-              <a:t>(1+returns</a:t>
-            </a:r>
-            <a:r>
-              <a:rPr lang="en-US" dirty="0"/>
-              <a:t>) </a:t>
-            </a:r>
-            <a:endParaRPr lang="en-US" dirty="0" smtClean="0"/>
-          </a:p>
-          <a:p>
-            <a:pPr marL="0" indent="0">
-              <a:buNone/>
-            </a:pPr>
-            <a:r>
-              <a:rPr lang="en-US" dirty="0" smtClean="0"/>
-              <a:t>[1] 1.050000 1.039500 1.070685 1.092099 1.103020 </a:t>
-            </a:r>
-          </a:p>
-          <a:p>
-            <a:pPr marL="0" indent="0">
-              <a:buNone/>
-            </a:pPr>
-            <a:r>
-              <a:rPr lang="en-US" dirty="0" smtClean="0"/>
-              <a:t>tail(</a:t>
-            </a:r>
-            <a:r>
-              <a:rPr lang="en-US" dirty="0" err="1" smtClean="0"/>
-              <a:t>cumprod</a:t>
-            </a:r>
-            <a:r>
-              <a:rPr lang="en-US" dirty="0" smtClean="0"/>
-              <a:t>(1+returns</a:t>
-            </a:r>
-            <a:r>
-              <a:rPr lang="en-US" dirty="0"/>
-              <a:t>),1)-1 </a:t>
-            </a:r>
-            <a:endParaRPr lang="en-US" dirty="0" smtClean="0"/>
-          </a:p>
-          <a:p>
-            <a:pPr marL="0" indent="0">
-              <a:buNone/>
-            </a:pPr>
-            <a:r>
-              <a:rPr lang="en-US" dirty="0" smtClean="0"/>
-              <a:t>[1] 0.1030197</a:t>
-            </a:r>
-            <a:endParaRPr lang="nl-BE" dirty="0"/>
-          </a:p>
-        </p:txBody>
-      </p:sp>
-    </p:spTree>
-    <p:extLst>
-      <p:ext uri="{BB962C8B-B14F-4D97-AF65-F5344CB8AC3E}">
-        <p14:creationId xmlns:p14="http://schemas.microsoft.com/office/powerpoint/2010/main" val="3707932661"/>
-      </p:ext>
-    </p:extLst>
-  </p:cSld>
-  <p:clrMapOvr>
-    <a:masterClrMapping/>
-  </p:clrMapOvr>
-</p:sld>
-</file>
-
 <file path=ppt/slides/slide33.xml><?xml version="1.0" encoding="utf-8"?>
 <p:sld xmlns:a="http://schemas.openxmlformats.org/drawingml/2006/main" xmlns:r="http://schemas.openxmlformats.org/officeDocument/2006/relationships" xmlns:p="http://schemas.openxmlformats.org/presentationml/2006/main">
   <p:cSld>
@@ -11234,6 +11160,138 @@
           <a:bodyPr/>
           <a:lstStyle/>
           <a:p>
+            <a:pPr marL="0" indent="0">
+              <a:buNone/>
+            </a:pPr>
+            <a:r>
+              <a:rPr lang="en-US" dirty="0" smtClean="0"/>
+              <a:t>returns &lt;- </a:t>
+            </a:r>
+            <a:r>
+              <a:rPr lang="en-US" dirty="0"/>
+              <a:t>c( 0.05 , -0.01 , 0.03 , 0.02 , 0.01 ) </a:t>
+            </a:r>
+            <a:r>
+              <a:rPr lang="en-US" dirty="0" err="1" smtClean="0"/>
+              <a:t>cumprod</a:t>
+            </a:r>
+            <a:r>
+              <a:rPr lang="en-US" dirty="0" smtClean="0"/>
+              <a:t>(1+returns</a:t>
+            </a:r>
+            <a:r>
+              <a:rPr lang="en-US" dirty="0"/>
+              <a:t>) </a:t>
+            </a:r>
+            <a:endParaRPr lang="en-US" dirty="0" smtClean="0"/>
+          </a:p>
+          <a:p>
+            <a:pPr marL="0" indent="0">
+              <a:buNone/>
+            </a:pPr>
+            <a:r>
+              <a:rPr lang="en-US" dirty="0" smtClean="0"/>
+              <a:t>[1] 1.050000 1.039500 1.070685 1.092099 1.103020 </a:t>
+            </a:r>
+          </a:p>
+          <a:p>
+            <a:pPr marL="0" indent="0">
+              <a:buNone/>
+            </a:pPr>
+            <a:r>
+              <a:rPr lang="en-US" dirty="0" smtClean="0"/>
+              <a:t>tail(</a:t>
+            </a:r>
+            <a:r>
+              <a:rPr lang="en-US" dirty="0" err="1" smtClean="0"/>
+              <a:t>cumprod</a:t>
+            </a:r>
+            <a:r>
+              <a:rPr lang="en-US" dirty="0" smtClean="0"/>
+              <a:t>(1+returns</a:t>
+            </a:r>
+            <a:r>
+              <a:rPr lang="en-US" dirty="0"/>
+              <a:t>),1)-1 </a:t>
+            </a:r>
+            <a:endParaRPr lang="en-US" dirty="0" smtClean="0"/>
+          </a:p>
+          <a:p>
+            <a:pPr marL="0" indent="0">
+              <a:buNone/>
+            </a:pPr>
+            <a:r>
+              <a:rPr lang="en-US" dirty="0" smtClean="0"/>
+              <a:t>[1] 0.1030197</a:t>
+            </a:r>
+            <a:endParaRPr lang="nl-BE" dirty="0"/>
+          </a:p>
+        </p:txBody>
+      </p:sp>
+    </p:spTree>
+    <p:extLst>
+      <p:ext uri="{BB962C8B-B14F-4D97-AF65-F5344CB8AC3E}">
+        <p14:creationId xmlns:p14="http://schemas.microsoft.com/office/powerpoint/2010/main" val="3707932661"/>
+      </p:ext>
+    </p:extLst>
+  </p:cSld>
+  <p:clrMapOvr>
+    <a:masterClrMapping/>
+  </p:clrMapOvr>
+</p:sld>
+</file>
+
+<file path=ppt/slides/slide34.xml><?xml version="1.0" encoding="utf-8"?>
+<p:sld xmlns:a="http://schemas.openxmlformats.org/drawingml/2006/main" xmlns:r="http://schemas.openxmlformats.org/officeDocument/2006/relationships" xmlns:p="http://schemas.openxmlformats.org/presentationml/2006/main">
+  <p:cSld>
+    <p:spTree>
+      <p:nvGrpSpPr>
+        <p:cNvPr id="1" name=""/>
+        <p:cNvGrpSpPr/>
+        <p:nvPr/>
+      </p:nvGrpSpPr>
+      <p:grpSpPr>
+        <a:xfrm>
+          <a:off x="0" y="0"/>
+          <a:ext cx="0" cy="0"/>
+          <a:chOff x="0" y="0"/>
+          <a:chExt cx="0" cy="0"/>
+        </a:xfrm>
+      </p:grpSpPr>
+      <p:sp>
+        <p:nvSpPr>
+          <p:cNvPr id="2" name="Title 1"/>
+          <p:cNvSpPr>
+            <a:spLocks noGrp="1"/>
+          </p:cNvSpPr>
+          <p:nvPr>
+            <p:ph type="title"/>
+          </p:nvPr>
+        </p:nvSpPr>
+        <p:spPr/>
+        <p:txBody>
+          <a:bodyPr/>
+          <a:lstStyle/>
+          <a:p>
+            <a:endParaRPr lang="nl-BE"/>
+          </a:p>
+        </p:txBody>
+      </p:sp>
+      <p:sp>
+        <p:nvSpPr>
+          <p:cNvPr id="3" name="Content Placeholder 2"/>
+          <p:cNvSpPr>
+            <a:spLocks noGrp="1"/>
+          </p:cNvSpPr>
+          <p:nvPr>
+            <p:ph idx="1"/>
+          </p:nvPr>
+        </p:nvSpPr>
+        <p:spPr/>
+        <p:txBody>
+          <a:bodyPr/>
+          <a:lstStyle/>
+          <a:p>
             <a:r>
               <a:rPr lang="nl-BE" dirty="0" smtClean="0"/>
               <a:t>Let us now consider a realistic portfolio of stocks, invested in 30 large US firms, namely the stocks included in the Dow Jones Industrial Average universe:</a:t>
@@ -11270,7 +11328,7 @@
 </p:sld>
 </file>
 
-<file path=ppt/slides/slide34.xml><?xml version="1.0" encoding="utf-8"?>
+<file path=ppt/slides/slide35.xml><?xml version="1.0" encoding="utf-8"?>
 <p:sld xmlns:a="http://schemas.openxmlformats.org/drawingml/2006/main" xmlns:r="http://schemas.openxmlformats.org/officeDocument/2006/relationships" xmlns:p="http://schemas.openxmlformats.org/presentationml/2006/main">
   <p:cSld>
     <p:spTree>
@@ -11399,7 +11457,7 @@
 </p:sld>
 </file>
 
-<file path=ppt/slides/slide35.xml><?xml version="1.0" encoding="utf-8"?>
+<file path=ppt/slides/slide36.xml><?xml version="1.0" encoding="utf-8"?>
 <p:sld xmlns:a="http://schemas.openxmlformats.org/drawingml/2006/main" xmlns:r="http://schemas.openxmlformats.org/officeDocument/2006/relationships" xmlns:p="http://schemas.openxmlformats.org/presentationml/2006/main">
   <p:cSld>
     <p:spTree>
@@ -11525,7 +11583,7 @@
 </p:sld>
 </file>
 
-<file path=ppt/slides/slide36.xml><?xml version="1.0" encoding="utf-8"?>
+<file path=ppt/slides/slide37.xml><?xml version="1.0" encoding="utf-8"?>
 <p:sld xmlns:a="http://schemas.openxmlformats.org/drawingml/2006/main" xmlns:r="http://schemas.openxmlformats.org/officeDocument/2006/relationships" xmlns:p="http://schemas.openxmlformats.org/presentationml/2006/main">
   <p:cSld>
     <p:spTree>

</xml_diff>